<commit_message>
Site updated: 2024-01-28 16:52:05
</commit_message>
<xml_diff>
--- a/图/新建 Microsoft PowerPoint 演示文稿.pptx
+++ b/图/新建 Microsoft PowerPoint 演示文稿.pptx
@@ -107,6 +107,11 @@
       </a:defRPr>
     </a:lvl9pPr>
   </p:defaultTextStyle>
+  <p:extLst>
+    <p:ext uri="{EFAFB233-063F-42B5-8137-9DF3F51BA10A}">
+      <p15:sldGuideLst xmlns:p15="http://schemas.microsoft.com/office/powerpoint/2012/main"/>
+    </p:ext>
+  </p:extLst>
 </p:presentation>
 </file>
 
@@ -192,7 +197,7 @@
           <a:p>
             <a:fld id="{84F75813-59CC-4A32-985D-85329376AF07}" type="datetimeFigureOut">
               <a:rPr lang="zh-CN" altLang="en-US" smtClean="0"/>
-              <a:t>2023-09-05</a:t>
+              <a:t>2023-09-06</a:t>
             </a:fld>
             <a:endParaRPr lang="zh-CN" altLang="en-US"/>
           </a:p>
@@ -690,7 +695,7 @@
           <a:p>
             <a:fld id="{11594540-CA71-4971-B460-93B9DDD54908}" type="datetimeFigureOut">
               <a:rPr lang="zh-CN" altLang="en-US" smtClean="0"/>
-              <a:t>2023-09-05</a:t>
+              <a:t>2023-09-06</a:t>
             </a:fld>
             <a:endParaRPr lang="zh-CN" altLang="en-US"/>
           </a:p>
@@ -888,7 +893,7 @@
           <a:p>
             <a:fld id="{11594540-CA71-4971-B460-93B9DDD54908}" type="datetimeFigureOut">
               <a:rPr lang="zh-CN" altLang="en-US" smtClean="0"/>
-              <a:t>2023-09-05</a:t>
+              <a:t>2023-09-06</a:t>
             </a:fld>
             <a:endParaRPr lang="zh-CN" altLang="en-US"/>
           </a:p>
@@ -1096,7 +1101,7 @@
           <a:p>
             <a:fld id="{11594540-CA71-4971-B460-93B9DDD54908}" type="datetimeFigureOut">
               <a:rPr lang="zh-CN" altLang="en-US" smtClean="0"/>
-              <a:t>2023-09-05</a:t>
+              <a:t>2023-09-06</a:t>
             </a:fld>
             <a:endParaRPr lang="zh-CN" altLang="en-US"/>
           </a:p>
@@ -1294,7 +1299,7 @@
           <a:p>
             <a:fld id="{11594540-CA71-4971-B460-93B9DDD54908}" type="datetimeFigureOut">
               <a:rPr lang="zh-CN" altLang="en-US" smtClean="0"/>
-              <a:t>2023-09-05</a:t>
+              <a:t>2023-09-06</a:t>
             </a:fld>
             <a:endParaRPr lang="zh-CN" altLang="en-US"/>
           </a:p>
@@ -1569,7 +1574,7 @@
           <a:p>
             <a:fld id="{11594540-CA71-4971-B460-93B9DDD54908}" type="datetimeFigureOut">
               <a:rPr lang="zh-CN" altLang="en-US" smtClean="0"/>
-              <a:t>2023-09-05</a:t>
+              <a:t>2023-09-06</a:t>
             </a:fld>
             <a:endParaRPr lang="zh-CN" altLang="en-US"/>
           </a:p>
@@ -1834,7 +1839,7 @@
           <a:p>
             <a:fld id="{11594540-CA71-4971-B460-93B9DDD54908}" type="datetimeFigureOut">
               <a:rPr lang="zh-CN" altLang="en-US" smtClean="0"/>
-              <a:t>2023-09-05</a:t>
+              <a:t>2023-09-06</a:t>
             </a:fld>
             <a:endParaRPr lang="zh-CN" altLang="en-US"/>
           </a:p>
@@ -2246,7 +2251,7 @@
           <a:p>
             <a:fld id="{11594540-CA71-4971-B460-93B9DDD54908}" type="datetimeFigureOut">
               <a:rPr lang="zh-CN" altLang="en-US" smtClean="0"/>
-              <a:t>2023-09-05</a:t>
+              <a:t>2023-09-06</a:t>
             </a:fld>
             <a:endParaRPr lang="zh-CN" altLang="en-US"/>
           </a:p>
@@ -2387,7 +2392,7 @@
           <a:p>
             <a:fld id="{11594540-CA71-4971-B460-93B9DDD54908}" type="datetimeFigureOut">
               <a:rPr lang="zh-CN" altLang="en-US" smtClean="0"/>
-              <a:t>2023-09-05</a:t>
+              <a:t>2023-09-06</a:t>
             </a:fld>
             <a:endParaRPr lang="zh-CN" altLang="en-US"/>
           </a:p>
@@ -2500,7 +2505,7 @@
           <a:p>
             <a:fld id="{11594540-CA71-4971-B460-93B9DDD54908}" type="datetimeFigureOut">
               <a:rPr lang="zh-CN" altLang="en-US" smtClean="0"/>
-              <a:t>2023-09-05</a:t>
+              <a:t>2023-09-06</a:t>
             </a:fld>
             <a:endParaRPr lang="zh-CN" altLang="en-US"/>
           </a:p>
@@ -2811,7 +2816,7 @@
           <a:p>
             <a:fld id="{11594540-CA71-4971-B460-93B9DDD54908}" type="datetimeFigureOut">
               <a:rPr lang="zh-CN" altLang="en-US" smtClean="0"/>
-              <a:t>2023-09-05</a:t>
+              <a:t>2023-09-06</a:t>
             </a:fld>
             <a:endParaRPr lang="zh-CN" altLang="en-US"/>
           </a:p>
@@ -3099,7 +3104,7 @@
           <a:p>
             <a:fld id="{11594540-CA71-4971-B460-93B9DDD54908}" type="datetimeFigureOut">
               <a:rPr lang="zh-CN" altLang="en-US" smtClean="0"/>
-              <a:t>2023-09-05</a:t>
+              <a:t>2023-09-06</a:t>
             </a:fld>
             <a:endParaRPr lang="zh-CN" altLang="en-US"/>
           </a:p>
@@ -3340,7 +3345,7 @@
           <a:p>
             <a:fld id="{11594540-CA71-4971-B460-93B9DDD54908}" type="datetimeFigureOut">
               <a:rPr lang="zh-CN" altLang="en-US" smtClean="0"/>
-              <a:t>2023-09-05</a:t>
+              <a:t>2023-09-06</a:t>
             </a:fld>
             <a:endParaRPr lang="zh-CN" altLang="en-US"/>
           </a:p>
@@ -4143,6 +4148,174 @@
                 <a:ea typeface="Adobe 黑体 Std R" panose="020B0400000000000000" pitchFamily="34" charset="-122"/>
               </a:rPr>
               <a:t>代码</a:t>
+            </a:r>
+          </a:p>
+        </p:txBody>
+      </p:sp>
+      <p:sp>
+        <p:nvSpPr>
+          <p:cNvPr id="11" name="文本框 10">
+            <a:extLst>
+              <a:ext uri="{FF2B5EF4-FFF2-40B4-BE49-F238E27FC236}">
+                <a16:creationId xmlns:a16="http://schemas.microsoft.com/office/drawing/2014/main" id="{498CF44A-17A4-4F72-9BEB-50D551606271}"/>
+              </a:ext>
+            </a:extLst>
+          </p:cNvPr>
+          <p:cNvSpPr txBox="1"/>
+          <p:nvPr/>
+        </p:nvSpPr>
+        <p:spPr>
+          <a:xfrm>
+            <a:off x="6390393" y="3414198"/>
+            <a:ext cx="2978701" cy="584775"/>
+          </a:xfrm>
+          <a:prstGeom prst="rect">
+            <a:avLst/>
+          </a:prstGeom>
+          <a:noFill/>
+        </p:spPr>
+        <p:txBody>
+          <a:bodyPr wrap="none" rtlCol="0">
+            <a:spAutoFit/>
+          </a:bodyPr>
+          <a:lstStyle/>
+          <a:p>
+            <a:pPr algn="ctr"/>
+            <a:r>
+              <a:rPr lang="en-US" altLang="zh-CN" sz="3200" dirty="0">
+                <a:solidFill>
+                  <a:schemeClr val="accent1">
+                    <a:lumMod val="75000"/>
+                  </a:schemeClr>
+                </a:solidFill>
+                <a:latin typeface="Adobe 黑体 Std R" panose="020B0400000000000000" pitchFamily="34" charset="-122"/>
+                <a:ea typeface="Adobe 黑体 Std R" panose="020B0400000000000000" pitchFamily="34" charset="-122"/>
+              </a:rPr>
+              <a:t>1.</a:t>
+            </a:r>
+            <a:r>
+              <a:rPr lang="zh-CN" altLang="en-US" sz="3200" dirty="0">
+                <a:solidFill>
+                  <a:schemeClr val="accent1">
+                    <a:lumMod val="75000"/>
+                  </a:schemeClr>
+                </a:solidFill>
+                <a:latin typeface="Adobe 黑体 Std R" panose="020B0400000000000000" pitchFamily="34" charset="-122"/>
+                <a:ea typeface="Adobe 黑体 Std R" panose="020B0400000000000000" pitchFamily="34" charset="-122"/>
+              </a:rPr>
+              <a:t>添加可信函数</a:t>
+            </a:r>
+          </a:p>
+        </p:txBody>
+      </p:sp>
+      <p:sp>
+        <p:nvSpPr>
+          <p:cNvPr id="13" name="文本框 12">
+            <a:extLst>
+              <a:ext uri="{FF2B5EF4-FFF2-40B4-BE49-F238E27FC236}">
+                <a16:creationId xmlns:a16="http://schemas.microsoft.com/office/drawing/2014/main" id="{61ED78A0-CEC5-4508-9E68-A3558ACF1C6F}"/>
+              </a:ext>
+            </a:extLst>
+          </p:cNvPr>
+          <p:cNvSpPr txBox="1"/>
+          <p:nvPr/>
+        </p:nvSpPr>
+        <p:spPr>
+          <a:xfrm>
+            <a:off x="6473079" y="2891945"/>
+            <a:ext cx="2978701" cy="584775"/>
+          </a:xfrm>
+          <a:prstGeom prst="rect">
+            <a:avLst/>
+          </a:prstGeom>
+          <a:noFill/>
+        </p:spPr>
+        <p:txBody>
+          <a:bodyPr wrap="none" rtlCol="0">
+            <a:spAutoFit/>
+          </a:bodyPr>
+          <a:lstStyle/>
+          <a:p>
+            <a:pPr algn="ctr"/>
+            <a:r>
+              <a:rPr lang="en-US" altLang="zh-CN" sz="3200" dirty="0">
+                <a:solidFill>
+                  <a:schemeClr val="accent1">
+                    <a:lumMod val="75000"/>
+                  </a:schemeClr>
+                </a:solidFill>
+                <a:latin typeface="Adobe 黑体 Std R" panose="020B0400000000000000" pitchFamily="34" charset="-122"/>
+                <a:ea typeface="Adobe 黑体 Std R" panose="020B0400000000000000" pitchFamily="34" charset="-122"/>
+              </a:rPr>
+              <a:t>2.</a:t>
+            </a:r>
+            <a:r>
+              <a:rPr lang="zh-CN" altLang="en-US" sz="3200" dirty="0">
+                <a:solidFill>
+                  <a:schemeClr val="accent1">
+                    <a:lumMod val="75000"/>
+                  </a:schemeClr>
+                </a:solidFill>
+                <a:latin typeface="Adobe 黑体 Std R" panose="020B0400000000000000" pitchFamily="34" charset="-122"/>
+                <a:ea typeface="Adobe 黑体 Std R" panose="020B0400000000000000" pitchFamily="34" charset="-122"/>
+              </a:rPr>
+              <a:t>定义可信函数</a:t>
+            </a:r>
+          </a:p>
+        </p:txBody>
+      </p:sp>
+      <p:sp>
+        <p:nvSpPr>
+          <p:cNvPr id="20" name="文本框 19">
+            <a:extLst>
+              <a:ext uri="{FF2B5EF4-FFF2-40B4-BE49-F238E27FC236}">
+                <a16:creationId xmlns:a16="http://schemas.microsoft.com/office/drawing/2014/main" id="{6E8C05C0-DDC8-4B9D-90D1-B15C67EA0D5D}"/>
+              </a:ext>
+            </a:extLst>
+          </p:cNvPr>
+          <p:cNvSpPr txBox="1"/>
+          <p:nvPr/>
+        </p:nvSpPr>
+        <p:spPr>
+          <a:xfrm>
+            <a:off x="5721780" y="1018421"/>
+            <a:ext cx="2157963" cy="584775"/>
+          </a:xfrm>
+          <a:prstGeom prst="rect">
+            <a:avLst/>
+          </a:prstGeom>
+          <a:noFill/>
+        </p:spPr>
+        <p:txBody>
+          <a:bodyPr wrap="none" rtlCol="0">
+            <a:spAutoFit/>
+          </a:bodyPr>
+          <a:lstStyle/>
+          <a:p>
+            <a:pPr algn="ctr"/>
+            <a:r>
+              <a:rPr lang="en-US" altLang="zh-CN" sz="3200" dirty="0">
+                <a:solidFill>
+                  <a:schemeClr val="accent1">
+                    <a:lumMod val="75000"/>
+                  </a:schemeClr>
+                </a:solidFill>
+                <a:latin typeface="Adobe 黑体 Std R" panose="020B0400000000000000" pitchFamily="34" charset="-122"/>
+                <a:ea typeface="Adobe 黑体 Std R" panose="020B0400000000000000" pitchFamily="34" charset="-122"/>
+              </a:rPr>
+              <a:t>3.</a:t>
+            </a:r>
+            <a:r>
+              <a:rPr lang="zh-CN" altLang="en-US" sz="3200" dirty="0">
+                <a:solidFill>
+                  <a:schemeClr val="accent1">
+                    <a:lumMod val="75000"/>
+                  </a:schemeClr>
+                </a:solidFill>
+                <a:latin typeface="Adobe 黑体 Std R" panose="020B0400000000000000" pitchFamily="34" charset="-122"/>
+                <a:ea typeface="Adobe 黑体 Std R" panose="020B0400000000000000" pitchFamily="34" charset="-122"/>
+              </a:rPr>
+              <a:t>调用函数</a:t>
             </a:r>
           </a:p>
         </p:txBody>

</xml_diff>